<commit_message>
Added SecretStore slide to design.pptx.
</commit_message>
<xml_diff>
--- a/docs/Design.pptx
+++ b/docs/Design.pptx
@@ -6,6 +6,7 @@
   </p:sldMasterIdLst>
   <p:sldIdLst>
     <p:sldId id="257" r:id="rId2"/>
+    <p:sldId id="258" r:id="rId3"/>
   </p:sldIdLst>
   <p:sldSz cx="12192000" cy="6858000"/>
   <p:notesSz cx="6858000" cy="9144000"/>
@@ -259,7 +260,7 @@
           <a:p>
             <a:fld id="{EEB5A699-4281-42A6-A7CC-966666C96966}" type="datetimeFigureOut">
               <a:rPr lang="en-US" smtClean="0"/>
-              <a:t>10/19/2021</a:t>
+              <a:t>12/7/2021</a:t>
             </a:fld>
             <a:endParaRPr lang="en-US"/>
           </a:p>
@@ -457,7 +458,7 @@
           <a:p>
             <a:fld id="{EEB5A699-4281-42A6-A7CC-966666C96966}" type="datetimeFigureOut">
               <a:rPr lang="en-US" smtClean="0"/>
-              <a:t>10/19/2021</a:t>
+              <a:t>12/7/2021</a:t>
             </a:fld>
             <a:endParaRPr lang="en-US"/>
           </a:p>
@@ -665,7 +666,7 @@
           <a:p>
             <a:fld id="{EEB5A699-4281-42A6-A7CC-966666C96966}" type="datetimeFigureOut">
               <a:rPr lang="en-US" smtClean="0"/>
-              <a:t>10/19/2021</a:t>
+              <a:t>12/7/2021</a:t>
             </a:fld>
             <a:endParaRPr lang="en-US"/>
           </a:p>
@@ -863,7 +864,7 @@
           <a:p>
             <a:fld id="{EEB5A699-4281-42A6-A7CC-966666C96966}" type="datetimeFigureOut">
               <a:rPr lang="en-US" smtClean="0"/>
-              <a:t>10/19/2021</a:t>
+              <a:t>12/7/2021</a:t>
             </a:fld>
             <a:endParaRPr lang="en-US"/>
           </a:p>
@@ -1138,7 +1139,7 @@
           <a:p>
             <a:fld id="{EEB5A699-4281-42A6-A7CC-966666C96966}" type="datetimeFigureOut">
               <a:rPr lang="en-US" smtClean="0"/>
-              <a:t>10/19/2021</a:t>
+              <a:t>12/7/2021</a:t>
             </a:fld>
             <a:endParaRPr lang="en-US"/>
           </a:p>
@@ -1403,7 +1404,7 @@
           <a:p>
             <a:fld id="{EEB5A699-4281-42A6-A7CC-966666C96966}" type="datetimeFigureOut">
               <a:rPr lang="en-US" smtClean="0"/>
-              <a:t>10/19/2021</a:t>
+              <a:t>12/7/2021</a:t>
             </a:fld>
             <a:endParaRPr lang="en-US"/>
           </a:p>
@@ -1815,7 +1816,7 @@
           <a:p>
             <a:fld id="{EEB5A699-4281-42A6-A7CC-966666C96966}" type="datetimeFigureOut">
               <a:rPr lang="en-US" smtClean="0"/>
-              <a:t>10/19/2021</a:t>
+              <a:t>12/7/2021</a:t>
             </a:fld>
             <a:endParaRPr lang="en-US"/>
           </a:p>
@@ -1956,7 +1957,7 @@
           <a:p>
             <a:fld id="{EEB5A699-4281-42A6-A7CC-966666C96966}" type="datetimeFigureOut">
               <a:rPr lang="en-US" smtClean="0"/>
-              <a:t>10/19/2021</a:t>
+              <a:t>12/7/2021</a:t>
             </a:fld>
             <a:endParaRPr lang="en-US"/>
           </a:p>
@@ -2069,7 +2070,7 @@
           <a:p>
             <a:fld id="{EEB5A699-4281-42A6-A7CC-966666C96966}" type="datetimeFigureOut">
               <a:rPr lang="en-US" smtClean="0"/>
-              <a:t>10/19/2021</a:t>
+              <a:t>12/7/2021</a:t>
             </a:fld>
             <a:endParaRPr lang="en-US"/>
           </a:p>
@@ -2380,7 +2381,7 @@
           <a:p>
             <a:fld id="{EEB5A699-4281-42A6-A7CC-966666C96966}" type="datetimeFigureOut">
               <a:rPr lang="en-US" smtClean="0"/>
-              <a:t>10/19/2021</a:t>
+              <a:t>12/7/2021</a:t>
             </a:fld>
             <a:endParaRPr lang="en-US"/>
           </a:p>
@@ -2668,7 +2669,7 @@
           <a:p>
             <a:fld id="{EEB5A699-4281-42A6-A7CC-966666C96966}" type="datetimeFigureOut">
               <a:rPr lang="en-US" smtClean="0"/>
-              <a:t>10/19/2021</a:t>
+              <a:t>12/7/2021</a:t>
             </a:fld>
             <a:endParaRPr lang="en-US"/>
           </a:p>
@@ -2909,7 +2910,7 @@
           <a:p>
             <a:fld id="{EEB5A699-4281-42A6-A7CC-966666C96966}" type="datetimeFigureOut">
               <a:rPr lang="en-US" smtClean="0"/>
-              <a:t>10/19/2021</a:t>
+              <a:t>12/7/2021</a:t>
             </a:fld>
             <a:endParaRPr lang="en-US"/>
           </a:p>
@@ -5742,6 +5743,1450 @@
 </p:sld>
 </file>
 
+<file path=ppt/slides/slide2.xml><?xml version="1.0" encoding="utf-8"?>
+<p:sld xmlns:a="http://schemas.openxmlformats.org/drawingml/2006/main" xmlns:r="http://schemas.openxmlformats.org/officeDocument/2006/relationships" xmlns:p="http://schemas.openxmlformats.org/presentationml/2006/main">
+  <p:cSld>
+    <p:spTree>
+      <p:nvGrpSpPr>
+        <p:cNvPr id="1" name=""/>
+        <p:cNvGrpSpPr/>
+        <p:nvPr/>
+      </p:nvGrpSpPr>
+      <p:grpSpPr>
+        <a:xfrm>
+          <a:off x="0" y="0"/>
+          <a:ext cx="0" cy="0"/>
+          <a:chOff x="0" y="0"/>
+          <a:chExt cx="0" cy="0"/>
+        </a:xfrm>
+      </p:grpSpPr>
+      <p:sp>
+        <p:nvSpPr>
+          <p:cNvPr id="40" name="Rectangle 39">
+            <a:extLst>
+              <a:ext uri="{FF2B5EF4-FFF2-40B4-BE49-F238E27FC236}">
+                <a16:creationId xmlns:a16="http://schemas.microsoft.com/office/drawing/2014/main" id="{3AB53FB8-4824-4557-AAC5-EBD0042BFB6C}"/>
+              </a:ext>
+            </a:extLst>
+          </p:cNvPr>
+          <p:cNvSpPr/>
+          <p:nvPr/>
+        </p:nvSpPr>
+        <p:spPr>
+          <a:xfrm>
+            <a:off x="8870493" y="949301"/>
+            <a:ext cx="2522108" cy="5221154"/>
+          </a:xfrm>
+          <a:prstGeom prst="rect">
+            <a:avLst/>
+          </a:prstGeom>
+          <a:solidFill>
+            <a:schemeClr val="bg1">
+              <a:lumMod val="95000"/>
+            </a:schemeClr>
+          </a:solidFill>
+          <a:ln>
+            <a:solidFill>
+              <a:schemeClr val="bg1">
+                <a:lumMod val="65000"/>
+              </a:schemeClr>
+            </a:solidFill>
+          </a:ln>
+        </p:spPr>
+        <p:style>
+          <a:lnRef idx="2">
+            <a:schemeClr val="accent1">
+              <a:shade val="50000"/>
+            </a:schemeClr>
+          </a:lnRef>
+          <a:fillRef idx="1">
+            <a:schemeClr val="accent1"/>
+          </a:fillRef>
+          <a:effectRef idx="0">
+            <a:schemeClr val="accent1"/>
+          </a:effectRef>
+          <a:fontRef idx="minor">
+            <a:schemeClr val="lt1"/>
+          </a:fontRef>
+        </p:style>
+        <p:txBody>
+          <a:bodyPr rtlCol="0" anchor="t"/>
+          <a:lstStyle/>
+          <a:p>
+            <a:pPr algn="ctr"/>
+            <a:r>
+              <a:rPr lang="en-US" sz="1200" dirty="0">
+                <a:solidFill>
+                  <a:schemeClr val="tx1">
+                    <a:lumMod val="85000"/>
+                    <a:lumOff val="15000"/>
+                  </a:schemeClr>
+                </a:solidFill>
+              </a:rPr>
+              <a:t>Azure</a:t>
+            </a:r>
+          </a:p>
+        </p:txBody>
+      </p:sp>
+      <p:sp>
+        <p:nvSpPr>
+          <p:cNvPr id="20" name="Rectangle 19">
+            <a:extLst>
+              <a:ext uri="{FF2B5EF4-FFF2-40B4-BE49-F238E27FC236}">
+                <a16:creationId xmlns:a16="http://schemas.microsoft.com/office/drawing/2014/main" id="{BB2DA161-37A9-4882-8564-57E286C55542}"/>
+              </a:ext>
+            </a:extLst>
+          </p:cNvPr>
+          <p:cNvSpPr/>
+          <p:nvPr/>
+        </p:nvSpPr>
+        <p:spPr>
+          <a:xfrm>
+            <a:off x="649770" y="949301"/>
+            <a:ext cx="7995698" cy="5221154"/>
+          </a:xfrm>
+          <a:prstGeom prst="rect">
+            <a:avLst/>
+          </a:prstGeom>
+          <a:solidFill>
+            <a:schemeClr val="bg1">
+              <a:lumMod val="95000"/>
+            </a:schemeClr>
+          </a:solidFill>
+          <a:ln>
+            <a:solidFill>
+              <a:schemeClr val="bg1">
+                <a:lumMod val="65000"/>
+              </a:schemeClr>
+            </a:solidFill>
+          </a:ln>
+        </p:spPr>
+        <p:style>
+          <a:lnRef idx="2">
+            <a:schemeClr val="accent1">
+              <a:shade val="50000"/>
+            </a:schemeClr>
+          </a:lnRef>
+          <a:fillRef idx="1">
+            <a:schemeClr val="accent1"/>
+          </a:fillRef>
+          <a:effectRef idx="0">
+            <a:schemeClr val="accent1"/>
+          </a:effectRef>
+          <a:fontRef idx="minor">
+            <a:schemeClr val="lt1"/>
+          </a:fontRef>
+        </p:style>
+        <p:txBody>
+          <a:bodyPr rtlCol="0" anchor="t"/>
+          <a:lstStyle/>
+          <a:p>
+            <a:pPr algn="ctr"/>
+            <a:r>
+              <a:rPr lang="en-US" sz="1200" dirty="0">
+                <a:solidFill>
+                  <a:schemeClr val="tx1">
+                    <a:lumMod val="85000"/>
+                    <a:lumOff val="15000"/>
+                  </a:schemeClr>
+                </a:solidFill>
+              </a:rPr>
+              <a:t>Edge Device</a:t>
+            </a:r>
+          </a:p>
+        </p:txBody>
+      </p:sp>
+      <p:sp>
+        <p:nvSpPr>
+          <p:cNvPr id="18" name="Rectangle 17">
+            <a:extLst>
+              <a:ext uri="{FF2B5EF4-FFF2-40B4-BE49-F238E27FC236}">
+                <a16:creationId xmlns:a16="http://schemas.microsoft.com/office/drawing/2014/main" id="{ED6B9CB4-24E2-43B6-8954-0C00F8B303E8}"/>
+              </a:ext>
+            </a:extLst>
+          </p:cNvPr>
+          <p:cNvSpPr/>
+          <p:nvPr/>
+        </p:nvSpPr>
+        <p:spPr>
+          <a:xfrm>
+            <a:off x="793865" y="1256430"/>
+            <a:ext cx="6713838" cy="4738580"/>
+          </a:xfrm>
+          <a:prstGeom prst="rect">
+            <a:avLst/>
+          </a:prstGeom>
+          <a:solidFill>
+            <a:schemeClr val="bg1">
+              <a:lumMod val="85000"/>
+            </a:schemeClr>
+          </a:solidFill>
+          <a:ln>
+            <a:solidFill>
+              <a:schemeClr val="bg1">
+                <a:lumMod val="65000"/>
+              </a:schemeClr>
+            </a:solidFill>
+          </a:ln>
+        </p:spPr>
+        <p:style>
+          <a:lnRef idx="2">
+            <a:schemeClr val="accent1">
+              <a:shade val="50000"/>
+            </a:schemeClr>
+          </a:lnRef>
+          <a:fillRef idx="1">
+            <a:schemeClr val="accent1"/>
+          </a:fillRef>
+          <a:effectRef idx="0">
+            <a:schemeClr val="accent1"/>
+          </a:effectRef>
+          <a:fontRef idx="minor">
+            <a:schemeClr val="lt1"/>
+          </a:fontRef>
+        </p:style>
+        <p:txBody>
+          <a:bodyPr rtlCol="0" anchor="t"/>
+          <a:lstStyle/>
+          <a:p>
+            <a:pPr algn="ctr"/>
+            <a:r>
+              <a:rPr lang="en-US" sz="1200" dirty="0">
+                <a:solidFill>
+                  <a:schemeClr val="tx1">
+                    <a:lumMod val="85000"/>
+                    <a:lumOff val="15000"/>
+                  </a:schemeClr>
+                </a:solidFill>
+              </a:rPr>
+              <a:t>Container</a:t>
+            </a:r>
+          </a:p>
+        </p:txBody>
+      </p:sp>
+      <p:sp>
+        <p:nvSpPr>
+          <p:cNvPr id="15" name="Rectangle 14">
+            <a:extLst>
+              <a:ext uri="{FF2B5EF4-FFF2-40B4-BE49-F238E27FC236}">
+                <a16:creationId xmlns:a16="http://schemas.microsoft.com/office/drawing/2014/main" id="{EAD70986-4A62-4F1B-884D-D85176FCA58D}"/>
+              </a:ext>
+            </a:extLst>
+          </p:cNvPr>
+          <p:cNvSpPr/>
+          <p:nvPr/>
+        </p:nvSpPr>
+        <p:spPr>
+          <a:xfrm>
+            <a:off x="951807" y="1598455"/>
+            <a:ext cx="5368529" cy="4209466"/>
+          </a:xfrm>
+          <a:prstGeom prst="rect">
+            <a:avLst/>
+          </a:prstGeom>
+          <a:solidFill>
+            <a:schemeClr val="bg1">
+              <a:lumMod val="75000"/>
+            </a:schemeClr>
+          </a:solidFill>
+          <a:ln>
+            <a:solidFill>
+              <a:schemeClr val="bg1">
+                <a:lumMod val="65000"/>
+              </a:schemeClr>
+            </a:solidFill>
+          </a:ln>
+        </p:spPr>
+        <p:style>
+          <a:lnRef idx="2">
+            <a:schemeClr val="accent1">
+              <a:shade val="50000"/>
+            </a:schemeClr>
+          </a:lnRef>
+          <a:fillRef idx="1">
+            <a:schemeClr val="accent1"/>
+          </a:fillRef>
+          <a:effectRef idx="0">
+            <a:schemeClr val="accent1"/>
+          </a:effectRef>
+          <a:fontRef idx="minor">
+            <a:schemeClr val="lt1"/>
+          </a:fontRef>
+        </p:style>
+        <p:txBody>
+          <a:bodyPr rtlCol="0" anchor="t"/>
+          <a:lstStyle/>
+          <a:p>
+            <a:pPr algn="ctr"/>
+            <a:r>
+              <a:rPr lang="en-US" sz="1200" dirty="0">
+                <a:solidFill>
+                  <a:schemeClr val="tx1">
+                    <a:lumMod val="85000"/>
+                    <a:lumOff val="15000"/>
+                  </a:schemeClr>
+                </a:solidFill>
+              </a:rPr>
+              <a:t>Memory</a:t>
+            </a:r>
+          </a:p>
+        </p:txBody>
+      </p:sp>
+      <p:sp>
+        <p:nvSpPr>
+          <p:cNvPr id="21" name="Cylinder 20">
+            <a:extLst>
+              <a:ext uri="{FF2B5EF4-FFF2-40B4-BE49-F238E27FC236}">
+                <a16:creationId xmlns:a16="http://schemas.microsoft.com/office/drawing/2014/main" id="{AE6217B0-27B4-4A04-A30E-8ADB875B17F4}"/>
+              </a:ext>
+            </a:extLst>
+          </p:cNvPr>
+          <p:cNvSpPr/>
+          <p:nvPr/>
+        </p:nvSpPr>
+        <p:spPr>
+          <a:xfrm>
+            <a:off x="7687976" y="3736190"/>
+            <a:ext cx="810135" cy="794849"/>
+          </a:xfrm>
+          <a:prstGeom prst="can">
+            <a:avLst/>
+          </a:prstGeom>
+        </p:spPr>
+        <p:style>
+          <a:lnRef idx="2">
+            <a:schemeClr val="accent6">
+              <a:shade val="50000"/>
+            </a:schemeClr>
+          </a:lnRef>
+          <a:fillRef idx="1">
+            <a:schemeClr val="accent6"/>
+          </a:fillRef>
+          <a:effectRef idx="0">
+            <a:schemeClr val="accent6"/>
+          </a:effectRef>
+          <a:fontRef idx="minor">
+            <a:schemeClr val="lt1"/>
+          </a:fontRef>
+        </p:style>
+        <p:txBody>
+          <a:bodyPr rtlCol="0" anchor="ctr"/>
+          <a:lstStyle/>
+          <a:p>
+            <a:pPr algn="ctr"/>
+            <a:r>
+              <a:rPr lang="en-US" sz="1200" dirty="0"/>
+              <a:t>File</a:t>
+            </a:r>
+            <a:br>
+              <a:rPr lang="en-US" sz="1200" dirty="0"/>
+            </a:br>
+            <a:r>
+              <a:rPr lang="en-US" sz="1200" dirty="0"/>
+              <a:t>System</a:t>
+            </a:r>
+            <a:endParaRPr lang="en-US" sz="1000" dirty="0"/>
+          </a:p>
+        </p:txBody>
+      </p:sp>
+      <p:sp>
+        <p:nvSpPr>
+          <p:cNvPr id="22" name="Cylinder 21">
+            <a:extLst>
+              <a:ext uri="{FF2B5EF4-FFF2-40B4-BE49-F238E27FC236}">
+                <a16:creationId xmlns:a16="http://schemas.microsoft.com/office/drawing/2014/main" id="{F03E37FC-C5F7-4784-88D0-E8CE990AA718}"/>
+              </a:ext>
+            </a:extLst>
+          </p:cNvPr>
+          <p:cNvSpPr/>
+          <p:nvPr/>
+        </p:nvSpPr>
+        <p:spPr>
+          <a:xfrm>
+            <a:off x="6492683" y="4158936"/>
+            <a:ext cx="810135" cy="794849"/>
+          </a:xfrm>
+          <a:prstGeom prst="can">
+            <a:avLst/>
+          </a:prstGeom>
+        </p:spPr>
+        <p:style>
+          <a:lnRef idx="2">
+            <a:schemeClr val="accent6">
+              <a:shade val="50000"/>
+            </a:schemeClr>
+          </a:lnRef>
+          <a:fillRef idx="1">
+            <a:schemeClr val="accent6"/>
+          </a:fillRef>
+          <a:effectRef idx="0">
+            <a:schemeClr val="accent6"/>
+          </a:effectRef>
+          <a:fontRef idx="minor">
+            <a:schemeClr val="lt1"/>
+          </a:fontRef>
+        </p:style>
+        <p:txBody>
+          <a:bodyPr rtlCol="0" anchor="ctr"/>
+          <a:lstStyle/>
+          <a:p>
+            <a:pPr algn="ctr"/>
+            <a:r>
+              <a:rPr lang="en-US" sz="1200" dirty="0"/>
+              <a:t>File</a:t>
+            </a:r>
+            <a:br>
+              <a:rPr lang="en-US" sz="1200" dirty="0"/>
+            </a:br>
+            <a:r>
+              <a:rPr lang="en-US" sz="1200" dirty="0"/>
+              <a:t>System</a:t>
+            </a:r>
+            <a:endParaRPr lang="en-US" sz="1000" dirty="0"/>
+          </a:p>
+        </p:txBody>
+      </p:sp>
+      <p:sp>
+        <p:nvSpPr>
+          <p:cNvPr id="24" name="Rectangle 23">
+            <a:extLst>
+              <a:ext uri="{FF2B5EF4-FFF2-40B4-BE49-F238E27FC236}">
+                <a16:creationId xmlns:a16="http://schemas.microsoft.com/office/drawing/2014/main" id="{D158F413-4BA7-4DC5-BF7D-DC92744EC88D}"/>
+              </a:ext>
+            </a:extLst>
+          </p:cNvPr>
+          <p:cNvSpPr/>
+          <p:nvPr/>
+        </p:nvSpPr>
+        <p:spPr>
+          <a:xfrm>
+            <a:off x="3059094" y="3875348"/>
+            <a:ext cx="1549654" cy="771753"/>
+          </a:xfrm>
+          <a:prstGeom prst="rect">
+            <a:avLst/>
+          </a:prstGeom>
+        </p:spPr>
+        <p:style>
+          <a:lnRef idx="2">
+            <a:schemeClr val="accent1">
+              <a:shade val="50000"/>
+            </a:schemeClr>
+          </a:lnRef>
+          <a:fillRef idx="1">
+            <a:schemeClr val="accent1"/>
+          </a:fillRef>
+          <a:effectRef idx="0">
+            <a:schemeClr val="accent1"/>
+          </a:effectRef>
+          <a:fontRef idx="minor">
+            <a:schemeClr val="lt1"/>
+          </a:fontRef>
+        </p:style>
+        <p:txBody>
+          <a:bodyPr rtlCol="0" anchor="ctr"/>
+          <a:lstStyle/>
+          <a:p>
+            <a:pPr algn="ctr"/>
+            <a:r>
+              <a:rPr lang="en-US" sz="1200" dirty="0" err="1"/>
+              <a:t>FileSecretStore</a:t>
+            </a:r>
+            <a:endParaRPr lang="en-US" sz="1200" dirty="0"/>
+          </a:p>
+        </p:txBody>
+      </p:sp>
+      <p:cxnSp>
+        <p:nvCxnSpPr>
+          <p:cNvPr id="26" name="Straight Arrow Connector 25">
+            <a:extLst>
+              <a:ext uri="{FF2B5EF4-FFF2-40B4-BE49-F238E27FC236}">
+                <a16:creationId xmlns:a16="http://schemas.microsoft.com/office/drawing/2014/main" id="{15B111DA-BF87-41D6-8AA0-67D17ABC3A89}"/>
+              </a:ext>
+            </a:extLst>
+          </p:cNvPr>
+          <p:cNvCxnSpPr>
+            <a:cxnSpLocks/>
+          </p:cNvCxnSpPr>
+          <p:nvPr/>
+        </p:nvCxnSpPr>
+        <p:spPr>
+          <a:xfrm>
+            <a:off x="4608747" y="4039211"/>
+            <a:ext cx="3076053" cy="0"/>
+          </a:xfrm>
+          <a:prstGeom prst="straightConnector1">
+            <a:avLst/>
+          </a:prstGeom>
+          <a:ln>
+            <a:tailEnd type="triangle"/>
+          </a:ln>
+        </p:spPr>
+        <p:style>
+          <a:lnRef idx="1">
+            <a:schemeClr val="accent1"/>
+          </a:lnRef>
+          <a:fillRef idx="0">
+            <a:schemeClr val="accent1"/>
+          </a:fillRef>
+          <a:effectRef idx="0">
+            <a:schemeClr val="accent1"/>
+          </a:effectRef>
+          <a:fontRef idx="minor">
+            <a:schemeClr val="tx1"/>
+          </a:fontRef>
+        </p:style>
+      </p:cxnSp>
+      <p:cxnSp>
+        <p:nvCxnSpPr>
+          <p:cNvPr id="28" name="Straight Arrow Connector 27">
+            <a:extLst>
+              <a:ext uri="{FF2B5EF4-FFF2-40B4-BE49-F238E27FC236}">
+                <a16:creationId xmlns:a16="http://schemas.microsoft.com/office/drawing/2014/main" id="{8E25B150-3325-4D7E-8023-EC3D27A40071}"/>
+              </a:ext>
+            </a:extLst>
+          </p:cNvPr>
+          <p:cNvCxnSpPr>
+            <a:cxnSpLocks/>
+          </p:cNvCxnSpPr>
+          <p:nvPr/>
+        </p:nvCxnSpPr>
+        <p:spPr>
+          <a:xfrm>
+            <a:off x="4608747" y="4485803"/>
+            <a:ext cx="1883936" cy="0"/>
+          </a:xfrm>
+          <a:prstGeom prst="straightConnector1">
+            <a:avLst/>
+          </a:prstGeom>
+          <a:ln>
+            <a:tailEnd type="triangle"/>
+          </a:ln>
+        </p:spPr>
+        <p:style>
+          <a:lnRef idx="1">
+            <a:schemeClr val="accent1"/>
+          </a:lnRef>
+          <a:fillRef idx="0">
+            <a:schemeClr val="accent1"/>
+          </a:fillRef>
+          <a:effectRef idx="0">
+            <a:schemeClr val="accent1"/>
+          </a:effectRef>
+          <a:fontRef idx="minor">
+            <a:schemeClr val="tx1"/>
+          </a:fontRef>
+        </p:style>
+      </p:cxnSp>
+      <p:sp>
+        <p:nvSpPr>
+          <p:cNvPr id="34" name="Rectangle 33">
+            <a:extLst>
+              <a:ext uri="{FF2B5EF4-FFF2-40B4-BE49-F238E27FC236}">
+                <a16:creationId xmlns:a16="http://schemas.microsoft.com/office/drawing/2014/main" id="{5AE70724-E262-4E47-9BFC-7D197979EFA3}"/>
+              </a:ext>
+            </a:extLst>
+          </p:cNvPr>
+          <p:cNvSpPr/>
+          <p:nvPr/>
+        </p:nvSpPr>
+        <p:spPr>
+          <a:xfrm>
+            <a:off x="3063485" y="4842062"/>
+            <a:ext cx="1549653" cy="771753"/>
+          </a:xfrm>
+          <a:prstGeom prst="rect">
+            <a:avLst/>
+          </a:prstGeom>
+        </p:spPr>
+        <p:style>
+          <a:lnRef idx="2">
+            <a:schemeClr val="accent1">
+              <a:shade val="50000"/>
+            </a:schemeClr>
+          </a:lnRef>
+          <a:fillRef idx="1">
+            <a:schemeClr val="accent1"/>
+          </a:fillRef>
+          <a:effectRef idx="0">
+            <a:schemeClr val="accent1"/>
+          </a:effectRef>
+          <a:fontRef idx="minor">
+            <a:schemeClr val="lt1"/>
+          </a:fontRef>
+        </p:style>
+        <p:txBody>
+          <a:bodyPr rtlCol="0" anchor="ctr"/>
+          <a:lstStyle/>
+          <a:p>
+            <a:pPr algn="ctr"/>
+            <a:r>
+              <a:rPr lang="en-US" sz="1200" dirty="0" err="1"/>
+              <a:t>InMemorySecretStore</a:t>
+            </a:r>
+            <a:endParaRPr lang="en-US" sz="1200" dirty="0"/>
+          </a:p>
+        </p:txBody>
+      </p:sp>
+      <p:sp>
+        <p:nvSpPr>
+          <p:cNvPr id="36" name="Rectangle 35">
+            <a:extLst>
+              <a:ext uri="{FF2B5EF4-FFF2-40B4-BE49-F238E27FC236}">
+                <a16:creationId xmlns:a16="http://schemas.microsoft.com/office/drawing/2014/main" id="{9E3BB4A0-F69F-4B74-A63C-F2D46FA75F11}"/>
+              </a:ext>
+            </a:extLst>
+          </p:cNvPr>
+          <p:cNvSpPr/>
+          <p:nvPr/>
+        </p:nvSpPr>
+        <p:spPr>
+          <a:xfrm>
+            <a:off x="3059092" y="2908634"/>
+            <a:ext cx="1549655" cy="771753"/>
+          </a:xfrm>
+          <a:prstGeom prst="rect">
+            <a:avLst/>
+          </a:prstGeom>
+        </p:spPr>
+        <p:style>
+          <a:lnRef idx="2">
+            <a:schemeClr val="accent1">
+              <a:shade val="50000"/>
+            </a:schemeClr>
+          </a:lnRef>
+          <a:fillRef idx="1">
+            <a:schemeClr val="accent1"/>
+          </a:fillRef>
+          <a:effectRef idx="0">
+            <a:schemeClr val="accent1"/>
+          </a:effectRef>
+          <a:fontRef idx="minor">
+            <a:schemeClr val="lt1"/>
+          </a:fontRef>
+        </p:style>
+        <p:txBody>
+          <a:bodyPr rtlCol="0" anchor="ctr"/>
+          <a:lstStyle/>
+          <a:p>
+            <a:pPr algn="ctr"/>
+            <a:r>
+              <a:rPr lang="en-US" sz="1200" dirty="0" err="1"/>
+              <a:t>KeyVaultSecretStore</a:t>
+            </a:r>
+            <a:endParaRPr lang="en-US" sz="1200" dirty="0"/>
+          </a:p>
+        </p:txBody>
+      </p:sp>
+      <p:sp>
+        <p:nvSpPr>
+          <p:cNvPr id="38" name="Rectangle 37">
+            <a:extLst>
+              <a:ext uri="{FF2B5EF4-FFF2-40B4-BE49-F238E27FC236}">
+                <a16:creationId xmlns:a16="http://schemas.microsoft.com/office/drawing/2014/main" id="{E6BF969C-5926-4436-B5D7-46CF53A6F0B9}"/>
+              </a:ext>
+            </a:extLst>
+          </p:cNvPr>
+          <p:cNvSpPr/>
+          <p:nvPr/>
+        </p:nvSpPr>
+        <p:spPr>
+          <a:xfrm>
+            <a:off x="3059092" y="1947502"/>
+            <a:ext cx="1549656" cy="771753"/>
+          </a:xfrm>
+          <a:prstGeom prst="rect">
+            <a:avLst/>
+          </a:prstGeom>
+        </p:spPr>
+        <p:style>
+          <a:lnRef idx="2">
+            <a:schemeClr val="accent1">
+              <a:shade val="50000"/>
+            </a:schemeClr>
+          </a:lnRef>
+          <a:fillRef idx="1">
+            <a:schemeClr val="accent1"/>
+          </a:fillRef>
+          <a:effectRef idx="0">
+            <a:schemeClr val="accent1"/>
+          </a:effectRef>
+          <a:fontRef idx="minor">
+            <a:schemeClr val="lt1"/>
+          </a:fontRef>
+        </p:style>
+        <p:txBody>
+          <a:bodyPr rtlCol="0" anchor="ctr"/>
+          <a:lstStyle/>
+          <a:p>
+            <a:pPr algn="ctr"/>
+            <a:r>
+              <a:rPr lang="en-US" sz="1200" dirty="0" err="1"/>
+              <a:t>RemoteSecretStore</a:t>
+            </a:r>
+            <a:endParaRPr lang="en-US" sz="1200" dirty="0"/>
+          </a:p>
+        </p:txBody>
+      </p:sp>
+      <p:sp>
+        <p:nvSpPr>
+          <p:cNvPr id="13" name="Cube 12">
+            <a:extLst>
+              <a:ext uri="{FF2B5EF4-FFF2-40B4-BE49-F238E27FC236}">
+                <a16:creationId xmlns:a16="http://schemas.microsoft.com/office/drawing/2014/main" id="{4288AFA0-2C10-436B-83B9-9BB6A126CF8A}"/>
+              </a:ext>
+            </a:extLst>
+          </p:cNvPr>
+          <p:cNvSpPr/>
+          <p:nvPr/>
+        </p:nvSpPr>
+        <p:spPr>
+          <a:xfrm>
+            <a:off x="5179976" y="4817504"/>
+            <a:ext cx="975235" cy="817330"/>
+          </a:xfrm>
+          <a:prstGeom prst="cube">
+            <a:avLst/>
+          </a:prstGeom>
+        </p:spPr>
+        <p:style>
+          <a:lnRef idx="2">
+            <a:schemeClr val="accent6">
+              <a:shade val="50000"/>
+            </a:schemeClr>
+          </a:lnRef>
+          <a:fillRef idx="1">
+            <a:schemeClr val="accent6"/>
+          </a:fillRef>
+          <a:effectRef idx="0">
+            <a:schemeClr val="accent6"/>
+          </a:effectRef>
+          <a:fontRef idx="minor">
+            <a:schemeClr val="lt1"/>
+          </a:fontRef>
+        </p:style>
+        <p:txBody>
+          <a:bodyPr rtlCol="0" anchor="ctr"/>
+          <a:lstStyle/>
+          <a:p>
+            <a:pPr algn="ctr"/>
+            <a:r>
+              <a:rPr lang="en-US" sz="1200" dirty="0"/>
+              <a:t>Memory</a:t>
+            </a:r>
+          </a:p>
+        </p:txBody>
+      </p:sp>
+      <p:cxnSp>
+        <p:nvCxnSpPr>
+          <p:cNvPr id="42" name="Straight Arrow Connector 41">
+            <a:extLst>
+              <a:ext uri="{FF2B5EF4-FFF2-40B4-BE49-F238E27FC236}">
+                <a16:creationId xmlns:a16="http://schemas.microsoft.com/office/drawing/2014/main" id="{D4FBA47B-526F-4FAE-869A-3F5D499BFC40}"/>
+              </a:ext>
+            </a:extLst>
+          </p:cNvPr>
+          <p:cNvCxnSpPr>
+            <a:cxnSpLocks/>
+          </p:cNvCxnSpPr>
+          <p:nvPr/>
+        </p:nvCxnSpPr>
+        <p:spPr>
+          <a:xfrm flipV="1">
+            <a:off x="4599045" y="5226169"/>
+            <a:ext cx="578645" cy="3526"/>
+          </a:xfrm>
+          <a:prstGeom prst="straightConnector1">
+            <a:avLst/>
+          </a:prstGeom>
+          <a:ln>
+            <a:tailEnd type="triangle"/>
+          </a:ln>
+        </p:spPr>
+        <p:style>
+          <a:lnRef idx="1">
+            <a:schemeClr val="accent1"/>
+          </a:lnRef>
+          <a:fillRef idx="0">
+            <a:schemeClr val="accent1"/>
+          </a:fillRef>
+          <a:effectRef idx="0">
+            <a:schemeClr val="accent1"/>
+          </a:effectRef>
+          <a:fontRef idx="minor">
+            <a:schemeClr val="tx1"/>
+          </a:fontRef>
+        </p:style>
+      </p:cxnSp>
+      <p:sp>
+        <p:nvSpPr>
+          <p:cNvPr id="63" name="Cube 62">
+            <a:extLst>
+              <a:ext uri="{FF2B5EF4-FFF2-40B4-BE49-F238E27FC236}">
+                <a16:creationId xmlns:a16="http://schemas.microsoft.com/office/drawing/2014/main" id="{DFC9D64E-952B-489D-B0C6-874F968480FA}"/>
+              </a:ext>
+            </a:extLst>
+          </p:cNvPr>
+          <p:cNvSpPr/>
+          <p:nvPr/>
+        </p:nvSpPr>
+        <p:spPr>
+          <a:xfrm>
+            <a:off x="9056994" y="2903371"/>
+            <a:ext cx="975235" cy="817330"/>
+          </a:xfrm>
+          <a:prstGeom prst="cube">
+            <a:avLst/>
+          </a:prstGeom>
+        </p:spPr>
+        <p:style>
+          <a:lnRef idx="2">
+            <a:schemeClr val="accent6">
+              <a:shade val="50000"/>
+            </a:schemeClr>
+          </a:lnRef>
+          <a:fillRef idx="1">
+            <a:schemeClr val="accent6"/>
+          </a:fillRef>
+          <a:effectRef idx="0">
+            <a:schemeClr val="accent6"/>
+          </a:effectRef>
+          <a:fontRef idx="minor">
+            <a:schemeClr val="lt1"/>
+          </a:fontRef>
+        </p:style>
+        <p:txBody>
+          <a:bodyPr rtlCol="0" anchor="ctr"/>
+          <a:lstStyle/>
+          <a:p>
+            <a:pPr algn="ctr"/>
+            <a:r>
+              <a:rPr lang="en-US" sz="1200" dirty="0"/>
+              <a:t>Key</a:t>
+            </a:r>
+            <a:br>
+              <a:rPr lang="en-US" sz="1200" dirty="0"/>
+            </a:br>
+            <a:r>
+              <a:rPr lang="en-US" sz="1200" dirty="0"/>
+              <a:t>Vault</a:t>
+            </a:r>
+          </a:p>
+        </p:txBody>
+      </p:sp>
+      <p:cxnSp>
+        <p:nvCxnSpPr>
+          <p:cNvPr id="65" name="Straight Arrow Connector 64">
+            <a:extLst>
+              <a:ext uri="{FF2B5EF4-FFF2-40B4-BE49-F238E27FC236}">
+                <a16:creationId xmlns:a16="http://schemas.microsoft.com/office/drawing/2014/main" id="{DA789781-8B57-42DA-A01D-8A08E355EF13}"/>
+              </a:ext>
+            </a:extLst>
+          </p:cNvPr>
+          <p:cNvCxnSpPr>
+            <a:cxnSpLocks/>
+            <a:stCxn id="36" idx="3"/>
+          </p:cNvCxnSpPr>
+          <p:nvPr/>
+        </p:nvCxnSpPr>
+        <p:spPr>
+          <a:xfrm>
+            <a:off x="4608747" y="3294511"/>
+            <a:ext cx="4448246" cy="17524"/>
+          </a:xfrm>
+          <a:prstGeom prst="straightConnector1">
+            <a:avLst/>
+          </a:prstGeom>
+          <a:ln>
+            <a:tailEnd type="triangle"/>
+          </a:ln>
+        </p:spPr>
+        <p:style>
+          <a:lnRef idx="1">
+            <a:schemeClr val="accent1"/>
+          </a:lnRef>
+          <a:fillRef idx="0">
+            <a:schemeClr val="accent1"/>
+          </a:fillRef>
+          <a:effectRef idx="0">
+            <a:schemeClr val="accent1"/>
+          </a:effectRef>
+          <a:fontRef idx="minor">
+            <a:schemeClr val="tx1"/>
+          </a:fontRef>
+        </p:style>
+      </p:cxnSp>
+      <p:sp>
+        <p:nvSpPr>
+          <p:cNvPr id="97" name="Rectangle 96">
+            <a:extLst>
+              <a:ext uri="{FF2B5EF4-FFF2-40B4-BE49-F238E27FC236}">
+                <a16:creationId xmlns:a16="http://schemas.microsoft.com/office/drawing/2014/main" id="{7DF48089-AAF6-4DF8-9AF0-A7011209CC71}"/>
+              </a:ext>
+            </a:extLst>
+          </p:cNvPr>
+          <p:cNvSpPr/>
+          <p:nvPr/>
+        </p:nvSpPr>
+        <p:spPr>
+          <a:xfrm>
+            <a:off x="9654937" y="1947502"/>
+            <a:ext cx="1549654" cy="771753"/>
+          </a:xfrm>
+          <a:prstGeom prst="rect">
+            <a:avLst/>
+          </a:prstGeom>
+        </p:spPr>
+        <p:style>
+          <a:lnRef idx="2">
+            <a:schemeClr val="accent1">
+              <a:shade val="50000"/>
+            </a:schemeClr>
+          </a:lnRef>
+          <a:fillRef idx="1">
+            <a:schemeClr val="accent1"/>
+          </a:fillRef>
+          <a:effectRef idx="0">
+            <a:schemeClr val="accent1"/>
+          </a:effectRef>
+          <a:fontRef idx="minor">
+            <a:schemeClr val="lt1"/>
+          </a:fontRef>
+        </p:style>
+        <p:txBody>
+          <a:bodyPr rtlCol="0" anchor="ctr"/>
+          <a:lstStyle/>
+          <a:p>
+            <a:pPr algn="ctr"/>
+            <a:r>
+              <a:rPr lang="en-US" sz="1200" dirty="0" err="1"/>
+              <a:t>SecretDeliveryApp</a:t>
+            </a:r>
+            <a:endParaRPr lang="en-US" sz="1200" dirty="0"/>
+          </a:p>
+        </p:txBody>
+      </p:sp>
+      <p:cxnSp>
+        <p:nvCxnSpPr>
+          <p:cNvPr id="102" name="Straight Arrow Connector 101">
+            <a:extLst>
+              <a:ext uri="{FF2B5EF4-FFF2-40B4-BE49-F238E27FC236}">
+                <a16:creationId xmlns:a16="http://schemas.microsoft.com/office/drawing/2014/main" id="{58DBE2F6-C8A4-4374-B1BB-F4FE5C9C0658}"/>
+              </a:ext>
+            </a:extLst>
+          </p:cNvPr>
+          <p:cNvCxnSpPr>
+            <a:cxnSpLocks/>
+          </p:cNvCxnSpPr>
+          <p:nvPr/>
+        </p:nvCxnSpPr>
+        <p:spPr>
+          <a:xfrm flipV="1">
+            <a:off x="4608748" y="2149215"/>
+            <a:ext cx="5046188" cy="9665"/>
+          </a:xfrm>
+          <a:prstGeom prst="straightConnector1">
+            <a:avLst/>
+          </a:prstGeom>
+          <a:ln>
+            <a:tailEnd type="triangle"/>
+          </a:ln>
+        </p:spPr>
+        <p:style>
+          <a:lnRef idx="1">
+            <a:schemeClr val="accent1"/>
+          </a:lnRef>
+          <a:fillRef idx="0">
+            <a:schemeClr val="accent1"/>
+          </a:fillRef>
+          <a:effectRef idx="0">
+            <a:schemeClr val="accent1"/>
+          </a:effectRef>
+          <a:fontRef idx="minor">
+            <a:schemeClr val="tx1"/>
+          </a:fontRef>
+        </p:style>
+      </p:cxnSp>
+      <p:cxnSp>
+        <p:nvCxnSpPr>
+          <p:cNvPr id="110" name="Straight Arrow Connector 109">
+            <a:extLst>
+              <a:ext uri="{FF2B5EF4-FFF2-40B4-BE49-F238E27FC236}">
+                <a16:creationId xmlns:a16="http://schemas.microsoft.com/office/drawing/2014/main" id="{1EE21B4D-B5DB-423C-BD64-375D4A7A7506}"/>
+              </a:ext>
+            </a:extLst>
+          </p:cNvPr>
+          <p:cNvCxnSpPr>
+            <a:cxnSpLocks/>
+          </p:cNvCxnSpPr>
+          <p:nvPr/>
+        </p:nvCxnSpPr>
+        <p:spPr>
+          <a:xfrm flipH="1">
+            <a:off x="4611925" y="2505875"/>
+            <a:ext cx="5037559" cy="0"/>
+          </a:xfrm>
+          <a:prstGeom prst="straightConnector1">
+            <a:avLst/>
+          </a:prstGeom>
+          <a:ln>
+            <a:tailEnd type="triangle"/>
+          </a:ln>
+        </p:spPr>
+        <p:style>
+          <a:lnRef idx="1">
+            <a:schemeClr val="accent1"/>
+          </a:lnRef>
+          <a:fillRef idx="0">
+            <a:schemeClr val="accent1"/>
+          </a:fillRef>
+          <a:effectRef idx="0">
+            <a:schemeClr val="accent1"/>
+          </a:effectRef>
+          <a:fontRef idx="minor">
+            <a:schemeClr val="tx1"/>
+          </a:fontRef>
+        </p:style>
+      </p:cxnSp>
+      <p:cxnSp>
+        <p:nvCxnSpPr>
+          <p:cNvPr id="115" name="Straight Connector 114">
+            <a:extLst>
+              <a:ext uri="{FF2B5EF4-FFF2-40B4-BE49-F238E27FC236}">
+                <a16:creationId xmlns:a16="http://schemas.microsoft.com/office/drawing/2014/main" id="{B808F644-42B4-4AB5-A454-2DB0F9ADB9FB}"/>
+              </a:ext>
+            </a:extLst>
+          </p:cNvPr>
+          <p:cNvCxnSpPr>
+            <a:cxnSpLocks/>
+          </p:cNvCxnSpPr>
+          <p:nvPr/>
+        </p:nvCxnSpPr>
+        <p:spPr>
+          <a:xfrm flipH="1">
+            <a:off x="10032230" y="3312035"/>
+            <a:ext cx="397534" cy="1"/>
+          </a:xfrm>
+          <a:prstGeom prst="line">
+            <a:avLst/>
+          </a:prstGeom>
+          <a:ln>
+            <a:tailEnd type="triangle"/>
+          </a:ln>
+        </p:spPr>
+        <p:style>
+          <a:lnRef idx="1">
+            <a:schemeClr val="accent1"/>
+          </a:lnRef>
+          <a:fillRef idx="0">
+            <a:schemeClr val="accent1"/>
+          </a:fillRef>
+          <a:effectRef idx="0">
+            <a:schemeClr val="accent1"/>
+          </a:effectRef>
+          <a:fontRef idx="minor">
+            <a:schemeClr val="tx1"/>
+          </a:fontRef>
+        </p:style>
+      </p:cxnSp>
+      <p:cxnSp>
+        <p:nvCxnSpPr>
+          <p:cNvPr id="118" name="Straight Connector 117">
+            <a:extLst>
+              <a:ext uri="{FF2B5EF4-FFF2-40B4-BE49-F238E27FC236}">
+                <a16:creationId xmlns:a16="http://schemas.microsoft.com/office/drawing/2014/main" id="{E2A94B18-ACF5-45A3-8887-11808E7CE5C1}"/>
+              </a:ext>
+            </a:extLst>
+          </p:cNvPr>
+          <p:cNvCxnSpPr>
+            <a:cxnSpLocks/>
+            <a:endCxn id="97" idx="2"/>
+          </p:cNvCxnSpPr>
+          <p:nvPr/>
+        </p:nvCxnSpPr>
+        <p:spPr>
+          <a:xfrm flipV="1">
+            <a:off x="10429764" y="2719255"/>
+            <a:ext cx="0" cy="592780"/>
+          </a:xfrm>
+          <a:prstGeom prst="line">
+            <a:avLst/>
+          </a:prstGeom>
+        </p:spPr>
+        <p:style>
+          <a:lnRef idx="1">
+            <a:schemeClr val="accent1"/>
+          </a:lnRef>
+          <a:fillRef idx="0">
+            <a:schemeClr val="accent1"/>
+          </a:fillRef>
+          <a:effectRef idx="0">
+            <a:schemeClr val="accent1"/>
+          </a:effectRef>
+          <a:fontRef idx="minor">
+            <a:schemeClr val="tx1"/>
+          </a:fontRef>
+        </p:style>
+      </p:cxnSp>
+      <p:sp>
+        <p:nvSpPr>
+          <p:cNvPr id="125" name="Rectangle 124">
+            <a:extLst>
+              <a:ext uri="{FF2B5EF4-FFF2-40B4-BE49-F238E27FC236}">
+                <a16:creationId xmlns:a16="http://schemas.microsoft.com/office/drawing/2014/main" id="{FA76CF27-1861-44EF-ABEB-D95BB06F7A38}"/>
+              </a:ext>
+            </a:extLst>
+          </p:cNvPr>
+          <p:cNvSpPr/>
+          <p:nvPr/>
+        </p:nvSpPr>
+        <p:spPr>
+          <a:xfrm>
+            <a:off x="4608748" y="1729603"/>
+            <a:ext cx="5046190" cy="419612"/>
+          </a:xfrm>
+          <a:prstGeom prst="rect">
+            <a:avLst/>
+          </a:prstGeom>
+          <a:noFill/>
+          <a:ln>
+            <a:noFill/>
+          </a:ln>
+        </p:spPr>
+        <p:style>
+          <a:lnRef idx="2">
+            <a:schemeClr val="accent1">
+              <a:shade val="50000"/>
+            </a:schemeClr>
+          </a:lnRef>
+          <a:fillRef idx="1">
+            <a:schemeClr val="accent1"/>
+          </a:fillRef>
+          <a:effectRef idx="0">
+            <a:schemeClr val="accent1"/>
+          </a:effectRef>
+          <a:fontRef idx="minor">
+            <a:schemeClr val="lt1"/>
+          </a:fontRef>
+        </p:style>
+        <p:txBody>
+          <a:bodyPr rtlCol="0" anchor="b"/>
+          <a:lstStyle/>
+          <a:p>
+            <a:pPr algn="ctr"/>
+            <a:r>
+              <a:rPr lang="en-US" sz="1200" dirty="0">
+                <a:solidFill>
+                  <a:srgbClr val="0070C0"/>
+                </a:solidFill>
+              </a:rPr>
+              <a:t>D2C Message { request-id, secrets[] }</a:t>
+            </a:r>
+          </a:p>
+        </p:txBody>
+      </p:sp>
+      <p:sp>
+        <p:nvSpPr>
+          <p:cNvPr id="128" name="Rectangle 127">
+            <a:extLst>
+              <a:ext uri="{FF2B5EF4-FFF2-40B4-BE49-F238E27FC236}">
+                <a16:creationId xmlns:a16="http://schemas.microsoft.com/office/drawing/2014/main" id="{0FE63655-4DD4-4D15-A282-669FBEC7C860}"/>
+              </a:ext>
+            </a:extLst>
+          </p:cNvPr>
+          <p:cNvSpPr/>
+          <p:nvPr/>
+        </p:nvSpPr>
+        <p:spPr>
+          <a:xfrm>
+            <a:off x="4603294" y="2090608"/>
+            <a:ext cx="5046190" cy="419612"/>
+          </a:xfrm>
+          <a:prstGeom prst="rect">
+            <a:avLst/>
+          </a:prstGeom>
+          <a:noFill/>
+          <a:ln>
+            <a:noFill/>
+          </a:ln>
+        </p:spPr>
+        <p:style>
+          <a:lnRef idx="2">
+            <a:schemeClr val="accent1">
+              <a:shade val="50000"/>
+            </a:schemeClr>
+          </a:lnRef>
+          <a:fillRef idx="1">
+            <a:schemeClr val="accent1"/>
+          </a:fillRef>
+          <a:effectRef idx="0">
+            <a:schemeClr val="accent1"/>
+          </a:effectRef>
+          <a:fontRef idx="minor">
+            <a:schemeClr val="lt1"/>
+          </a:fontRef>
+        </p:style>
+        <p:txBody>
+          <a:bodyPr rtlCol="0" anchor="b"/>
+          <a:lstStyle/>
+          <a:p>
+            <a:pPr algn="ctr"/>
+            <a:r>
+              <a:rPr lang="en-US" sz="1200" dirty="0">
+                <a:solidFill>
+                  <a:srgbClr val="0070C0"/>
+                </a:solidFill>
+              </a:rPr>
+              <a:t>DirectMethod </a:t>
+            </a:r>
+            <a:r>
+              <a:rPr lang="en-US" sz="1200" b="1" dirty="0" err="1">
+                <a:solidFill>
+                  <a:srgbClr val="0070C0"/>
+                </a:solidFill>
+              </a:rPr>
+              <a:t>UpdateSecrets</a:t>
+            </a:r>
+            <a:r>
+              <a:rPr lang="en-US" sz="1200" dirty="0">
+                <a:solidFill>
+                  <a:srgbClr val="0070C0"/>
+                </a:solidFill>
+              </a:rPr>
+              <a:t> { request-id, secrets[] }</a:t>
+            </a:r>
+          </a:p>
+        </p:txBody>
+      </p:sp>
+      <p:sp>
+        <p:nvSpPr>
+          <p:cNvPr id="149" name="Rectangle 148">
+            <a:extLst>
+              <a:ext uri="{FF2B5EF4-FFF2-40B4-BE49-F238E27FC236}">
+                <a16:creationId xmlns:a16="http://schemas.microsoft.com/office/drawing/2014/main" id="{867E6305-1A21-40EA-8CD2-98386EEBB19B}"/>
+              </a:ext>
+            </a:extLst>
+          </p:cNvPr>
+          <p:cNvSpPr/>
+          <p:nvPr/>
+        </p:nvSpPr>
+        <p:spPr>
+          <a:xfrm>
+            <a:off x="1120802" y="3387183"/>
+            <a:ext cx="1549654" cy="771753"/>
+          </a:xfrm>
+          <a:prstGeom prst="rect">
+            <a:avLst/>
+          </a:prstGeom>
+        </p:spPr>
+        <p:style>
+          <a:lnRef idx="2">
+            <a:schemeClr val="accent1">
+              <a:shade val="50000"/>
+            </a:schemeClr>
+          </a:lnRef>
+          <a:fillRef idx="1">
+            <a:schemeClr val="accent1"/>
+          </a:fillRef>
+          <a:effectRef idx="0">
+            <a:schemeClr val="accent1"/>
+          </a:effectRef>
+          <a:fontRef idx="minor">
+            <a:schemeClr val="lt1"/>
+          </a:fontRef>
+        </p:style>
+        <p:txBody>
+          <a:bodyPr rtlCol="0" anchor="ctr"/>
+          <a:lstStyle/>
+          <a:p>
+            <a:pPr algn="ctr"/>
+            <a:r>
+              <a:rPr lang="en-US" sz="1200" dirty="0" err="1"/>
+              <a:t>SecretManagerClient</a:t>
+            </a:r>
+            <a:endParaRPr lang="en-US" sz="1200" dirty="0"/>
+          </a:p>
+        </p:txBody>
+      </p:sp>
+      <p:cxnSp>
+        <p:nvCxnSpPr>
+          <p:cNvPr id="156" name="Straight Arrow Connector 155">
+            <a:extLst>
+              <a:ext uri="{FF2B5EF4-FFF2-40B4-BE49-F238E27FC236}">
+                <a16:creationId xmlns:a16="http://schemas.microsoft.com/office/drawing/2014/main" id="{1B92FCEA-745D-4B6B-8A22-84B00D94B9FF}"/>
+              </a:ext>
+            </a:extLst>
+          </p:cNvPr>
+          <p:cNvCxnSpPr>
+            <a:cxnSpLocks/>
+          </p:cNvCxnSpPr>
+          <p:nvPr/>
+        </p:nvCxnSpPr>
+        <p:spPr>
+          <a:xfrm flipV="1">
+            <a:off x="2661557" y="2719256"/>
+            <a:ext cx="397535" cy="771753"/>
+          </a:xfrm>
+          <a:prstGeom prst="straightConnector1">
+            <a:avLst/>
+          </a:prstGeom>
+          <a:ln>
+            <a:tailEnd type="triangle"/>
+          </a:ln>
+        </p:spPr>
+        <p:style>
+          <a:lnRef idx="1">
+            <a:schemeClr val="accent1"/>
+          </a:lnRef>
+          <a:fillRef idx="0">
+            <a:schemeClr val="accent1"/>
+          </a:fillRef>
+          <a:effectRef idx="0">
+            <a:schemeClr val="accent1"/>
+          </a:effectRef>
+          <a:fontRef idx="minor">
+            <a:schemeClr val="tx1"/>
+          </a:fontRef>
+        </p:style>
+      </p:cxnSp>
+      <p:cxnSp>
+        <p:nvCxnSpPr>
+          <p:cNvPr id="161" name="Straight Arrow Connector 160">
+            <a:extLst>
+              <a:ext uri="{FF2B5EF4-FFF2-40B4-BE49-F238E27FC236}">
+                <a16:creationId xmlns:a16="http://schemas.microsoft.com/office/drawing/2014/main" id="{58BE9EDE-FF09-4C58-9D3F-0C2B40FC8758}"/>
+              </a:ext>
+            </a:extLst>
+          </p:cNvPr>
+          <p:cNvCxnSpPr>
+            <a:cxnSpLocks/>
+          </p:cNvCxnSpPr>
+          <p:nvPr/>
+        </p:nvCxnSpPr>
+        <p:spPr>
+          <a:xfrm>
+            <a:off x="2661557" y="4039212"/>
+            <a:ext cx="397534" cy="802850"/>
+          </a:xfrm>
+          <a:prstGeom prst="straightConnector1">
+            <a:avLst/>
+          </a:prstGeom>
+          <a:ln>
+            <a:tailEnd type="triangle"/>
+          </a:ln>
+        </p:spPr>
+        <p:style>
+          <a:lnRef idx="1">
+            <a:schemeClr val="accent1"/>
+          </a:lnRef>
+          <a:fillRef idx="0">
+            <a:schemeClr val="accent1"/>
+          </a:fillRef>
+          <a:effectRef idx="0">
+            <a:schemeClr val="accent1"/>
+          </a:effectRef>
+          <a:fontRef idx="minor">
+            <a:schemeClr val="tx1"/>
+          </a:fontRef>
+        </p:style>
+      </p:cxnSp>
+      <p:cxnSp>
+        <p:nvCxnSpPr>
+          <p:cNvPr id="166" name="Straight Arrow Connector 165">
+            <a:extLst>
+              <a:ext uri="{FF2B5EF4-FFF2-40B4-BE49-F238E27FC236}">
+                <a16:creationId xmlns:a16="http://schemas.microsoft.com/office/drawing/2014/main" id="{5F5018DD-D705-48B3-9127-014F9B766731}"/>
+              </a:ext>
+            </a:extLst>
+          </p:cNvPr>
+          <p:cNvCxnSpPr>
+            <a:cxnSpLocks/>
+            <a:endCxn id="36" idx="1"/>
+          </p:cNvCxnSpPr>
+          <p:nvPr/>
+        </p:nvCxnSpPr>
+        <p:spPr>
+          <a:xfrm flipV="1">
+            <a:off x="2669868" y="3294511"/>
+            <a:ext cx="389224" cy="348898"/>
+          </a:xfrm>
+          <a:prstGeom prst="straightConnector1">
+            <a:avLst/>
+          </a:prstGeom>
+          <a:ln>
+            <a:tailEnd type="triangle"/>
+          </a:ln>
+        </p:spPr>
+        <p:style>
+          <a:lnRef idx="1">
+            <a:schemeClr val="accent1"/>
+          </a:lnRef>
+          <a:fillRef idx="0">
+            <a:schemeClr val="accent1"/>
+          </a:fillRef>
+          <a:effectRef idx="0">
+            <a:schemeClr val="accent1"/>
+          </a:effectRef>
+          <a:fontRef idx="minor">
+            <a:schemeClr val="tx1"/>
+          </a:fontRef>
+        </p:style>
+      </p:cxnSp>
+      <p:cxnSp>
+        <p:nvCxnSpPr>
+          <p:cNvPr id="170" name="Straight Arrow Connector 169">
+            <a:extLst>
+              <a:ext uri="{FF2B5EF4-FFF2-40B4-BE49-F238E27FC236}">
+                <a16:creationId xmlns:a16="http://schemas.microsoft.com/office/drawing/2014/main" id="{09E16FA2-2388-4FA4-94CD-69F52F28C92D}"/>
+              </a:ext>
+            </a:extLst>
+          </p:cNvPr>
+          <p:cNvCxnSpPr>
+            <a:cxnSpLocks/>
+            <a:endCxn id="24" idx="1"/>
+          </p:cNvCxnSpPr>
+          <p:nvPr/>
+        </p:nvCxnSpPr>
+        <p:spPr>
+          <a:xfrm>
+            <a:off x="2669867" y="3875349"/>
+            <a:ext cx="389227" cy="385876"/>
+          </a:xfrm>
+          <a:prstGeom prst="straightConnector1">
+            <a:avLst/>
+          </a:prstGeom>
+          <a:ln>
+            <a:tailEnd type="triangle"/>
+          </a:ln>
+        </p:spPr>
+        <p:style>
+          <a:lnRef idx="1">
+            <a:schemeClr val="accent1"/>
+          </a:lnRef>
+          <a:fillRef idx="0">
+            <a:schemeClr val="accent1"/>
+          </a:fillRef>
+          <a:effectRef idx="0">
+            <a:schemeClr val="accent1"/>
+          </a:effectRef>
+          <a:fontRef idx="minor">
+            <a:schemeClr val="tx1"/>
+          </a:fontRef>
+        </p:style>
+      </p:cxnSp>
+    </p:spTree>
+    <p:extLst>
+      <p:ext uri="{BB962C8B-B14F-4D97-AF65-F5344CB8AC3E}">
+        <p14:creationId xmlns:p14="http://schemas.microsoft.com/office/powerpoint/2010/main" val="2603714392"/>
+      </p:ext>
+    </p:extLst>
+  </p:cSld>
+  <p:clrMapOvr>
+    <a:masterClrMapping/>
+  </p:clrMapOvr>
+</p:sld>
+</file>
+
 <file path=ppt/theme/theme1.xml><?xml version="1.0" encoding="utf-8"?>
 <a:theme xmlns:a="http://schemas.openxmlformats.org/drawingml/2006/main" name="Office Theme">
   <a:themeElements>

</xml_diff>